<commit_message>
Changes to text of presentation
</commit_message>
<xml_diff>
--- a/Presentation1/slides/An Intro to FSharp For CSharp Programmers.pptx
+++ b/Presentation1/slides/An Intro to FSharp For CSharp Programmers.pptx
@@ -311,7 +311,7 @@
           <a:p>
             <a:fld id="{AEDEC170-FE74-46D3-95F6-64B523252ADB}" type="datetimeFigureOut">
               <a:rPr lang="en-US" smtClean="0"/>
-              <a:t>1/19/2015</a:t>
+              <a:t>1/20/2015</a:t>
             </a:fld>
             <a:endParaRPr lang="en-US"/>
           </a:p>
@@ -578,7 +578,7 @@
           <a:p>
             <a:fld id="{AEDEC170-FE74-46D3-95F6-64B523252ADB}" type="datetimeFigureOut">
               <a:rPr lang="en-US" smtClean="0"/>
-              <a:t>1/19/2015</a:t>
+              <a:t>1/20/2015</a:t>
             </a:fld>
             <a:endParaRPr lang="en-US"/>
           </a:p>
@@ -809,7 +809,7 @@
           <a:p>
             <a:fld id="{AEDEC170-FE74-46D3-95F6-64B523252ADB}" type="datetimeFigureOut">
               <a:rPr lang="en-US" smtClean="0"/>
-              <a:t>1/19/2015</a:t>
+              <a:t>1/20/2015</a:t>
             </a:fld>
             <a:endParaRPr lang="en-US"/>
           </a:p>
@@ -1119,7 +1119,7 @@
           <a:p>
             <a:fld id="{AEDEC170-FE74-46D3-95F6-64B523252ADB}" type="datetimeFigureOut">
               <a:rPr lang="en-US" smtClean="0"/>
-              <a:t>1/19/2015</a:t>
+              <a:t>1/20/2015</a:t>
             </a:fld>
             <a:endParaRPr lang="en-US"/>
           </a:p>
@@ -1592,7 +1592,7 @@
           <a:p>
             <a:fld id="{AEDEC170-FE74-46D3-95F6-64B523252ADB}" type="datetimeFigureOut">
               <a:rPr lang="en-US" smtClean="0"/>
-              <a:t>1/19/2015</a:t>
+              <a:t>1/20/2015</a:t>
             </a:fld>
             <a:endParaRPr lang="en-US"/>
           </a:p>
@@ -2139,7 +2139,7 @@
           <a:p>
             <a:fld id="{AEDEC170-FE74-46D3-95F6-64B523252ADB}" type="datetimeFigureOut">
               <a:rPr lang="en-US" smtClean="0"/>
-              <a:t>1/19/2015</a:t>
+              <a:t>1/20/2015</a:t>
             </a:fld>
             <a:endParaRPr lang="en-US"/>
           </a:p>
@@ -2913,7 +2913,7 @@
           <a:p>
             <a:fld id="{AEDEC170-FE74-46D3-95F6-64B523252ADB}" type="datetimeFigureOut">
               <a:rPr lang="en-US" smtClean="0"/>
-              <a:t>1/19/2015</a:t>
+              <a:t>1/20/2015</a:t>
             </a:fld>
             <a:endParaRPr lang="en-US"/>
           </a:p>
@@ -3088,7 +3088,7 @@
           <a:p>
             <a:fld id="{AEDEC170-FE74-46D3-95F6-64B523252ADB}" type="datetimeFigureOut">
               <a:rPr lang="en-US" smtClean="0"/>
-              <a:t>1/19/2015</a:t>
+              <a:t>1/20/2015</a:t>
             </a:fld>
             <a:endParaRPr lang="en-US"/>
           </a:p>
@@ -3311,7 +3311,7 @@
           <a:p>
             <a:fld id="{AEDEC170-FE74-46D3-95F6-64B523252ADB}" type="datetimeFigureOut">
               <a:rPr lang="en-US" smtClean="0"/>
-              <a:t>1/19/2015</a:t>
+              <a:t>1/20/2015</a:t>
             </a:fld>
             <a:endParaRPr lang="en-US"/>
           </a:p>
@@ -3491,7 +3491,7 @@
           <a:p>
             <a:fld id="{AEDEC170-FE74-46D3-95F6-64B523252ADB}" type="datetimeFigureOut">
               <a:rPr lang="en-US" smtClean="0"/>
-              <a:t>1/19/2015</a:t>
+              <a:t>1/20/2015</a:t>
             </a:fld>
             <a:endParaRPr lang="en-US"/>
           </a:p>
@@ -3780,7 +3780,7 @@
           <a:p>
             <a:fld id="{AEDEC170-FE74-46D3-95F6-64B523252ADB}" type="datetimeFigureOut">
               <a:rPr lang="en-US" smtClean="0"/>
-              <a:t>1/19/2015</a:t>
+              <a:t>1/20/2015</a:t>
             </a:fld>
             <a:endParaRPr lang="en-US"/>
           </a:p>
@@ -4022,7 +4022,7 @@
           <a:p>
             <a:fld id="{AEDEC170-FE74-46D3-95F6-64B523252ADB}" type="datetimeFigureOut">
               <a:rPr lang="en-US" smtClean="0"/>
-              <a:t>1/19/2015</a:t>
+              <a:t>1/20/2015</a:t>
             </a:fld>
             <a:endParaRPr lang="en-US"/>
           </a:p>
@@ -4401,7 +4401,7 @@
           <a:p>
             <a:fld id="{AEDEC170-FE74-46D3-95F6-64B523252ADB}" type="datetimeFigureOut">
               <a:rPr lang="en-US" smtClean="0"/>
-              <a:t>1/19/2015</a:t>
+              <a:t>1/20/2015</a:t>
             </a:fld>
             <a:endParaRPr lang="en-US"/>
           </a:p>
@@ -4519,7 +4519,7 @@
           <a:p>
             <a:fld id="{AEDEC170-FE74-46D3-95F6-64B523252ADB}" type="datetimeFigureOut">
               <a:rPr lang="en-US" smtClean="0"/>
-              <a:t>1/19/2015</a:t>
+              <a:t>1/20/2015</a:t>
             </a:fld>
             <a:endParaRPr lang="en-US"/>
           </a:p>
@@ -4614,7 +4614,7 @@
           <a:p>
             <a:fld id="{AEDEC170-FE74-46D3-95F6-64B523252ADB}" type="datetimeFigureOut">
               <a:rPr lang="en-US" smtClean="0"/>
-              <a:t>1/19/2015</a:t>
+              <a:t>1/20/2015</a:t>
             </a:fld>
             <a:endParaRPr lang="en-US"/>
           </a:p>
@@ -4863,7 +4863,7 @@
           <a:p>
             <a:fld id="{AEDEC170-FE74-46D3-95F6-64B523252ADB}" type="datetimeFigureOut">
               <a:rPr lang="en-US" smtClean="0"/>
-              <a:t>1/19/2015</a:t>
+              <a:t>1/20/2015</a:t>
             </a:fld>
             <a:endParaRPr lang="en-US"/>
           </a:p>
@@ -5120,7 +5120,7 @@
           <a:p>
             <a:fld id="{AEDEC170-FE74-46D3-95F6-64B523252ADB}" type="datetimeFigureOut">
               <a:rPr lang="en-US" smtClean="0"/>
-              <a:t>1/19/2015</a:t>
+              <a:t>1/20/2015</a:t>
             </a:fld>
             <a:endParaRPr lang="en-US"/>
           </a:p>
@@ -5363,7 +5363,7 @@
           <a:p>
             <a:fld id="{AEDEC170-FE74-46D3-95F6-64B523252ADB}" type="datetimeFigureOut">
               <a:rPr lang="en-US" smtClean="0"/>
-              <a:t>1/19/2015</a:t>
+              <a:t>1/20/2015</a:t>
             </a:fld>
             <a:endParaRPr lang="en-US"/>
           </a:p>
@@ -7037,8 +7037,51 @@
           <a:p>
             <a:r>
               <a:rPr lang="en-US" dirty="0"/>
-              <a:t>Intellisense gives discoverability</a:t>
-            </a:r>
+              <a:t>Intellisense gives </a:t>
+            </a:r>
+            <a:r>
+              <a:rPr lang="en-US" dirty="0" smtClean="0"/>
+              <a:t>discoverability</a:t>
+            </a:r>
+          </a:p>
+          <a:p>
+            <a:r>
+              <a:rPr lang="en-US" dirty="0" smtClean="0"/>
+              <a:t>Type Providers available for </a:t>
+            </a:r>
+          </a:p>
+          <a:p>
+            <a:pPr lvl="1"/>
+            <a:r>
+              <a:rPr lang="en-US" dirty="0" smtClean="0"/>
+              <a:t>Csv, OData, JSON, SQL, XML, XAML, WorldBank, FreeBase, </a:t>
+            </a:r>
+          </a:p>
+          <a:p>
+            <a:pPr lvl="1"/>
+            <a:r>
+              <a:rPr lang="en-US" dirty="0" smtClean="0"/>
+              <a:t>WMI, Hadoop/Hive, R, TypeScript, WSDL, EntityFramework</a:t>
+            </a:r>
+          </a:p>
+          <a:p>
+            <a:pPr lvl="1"/>
+            <a:r>
+              <a:rPr lang="en-US" dirty="0" smtClean="0"/>
+              <a:t>PostGis, Excel, Twitter,</a:t>
+            </a:r>
+            <a:r>
+              <a:rPr lang="en-US" dirty="0" smtClean="0"/>
+              <a:t> …</a:t>
+            </a:r>
+          </a:p>
+          <a:p>
+            <a:pPr lvl="1"/>
+            <a:r>
+              <a:rPr lang="en-US" dirty="0" smtClean="0"/>
+              <a:t>If it doesn’t exist you can build it</a:t>
+            </a:r>
+            <a:endParaRPr lang="en-US" dirty="0"/>
           </a:p>
         </p:txBody>
       </p:sp>
@@ -7384,14 +7427,38 @@
           <a:p>
             <a:r>
               <a:rPr lang="en-US" dirty="0"/>
-              <a:t>F# is both functional and Object Oriented</a:t>
-            </a:r>
-          </a:p>
-          <a:p>
-            <a:r>
-              <a:rPr lang="en-US" dirty="0"/>
-              <a:t>F# is a very robust language</a:t>
-            </a:r>
+              <a:t>F# is both </a:t>
+            </a:r>
+            <a:r>
+              <a:rPr lang="en-US" dirty="0" smtClean="0"/>
+              <a:t>Fu</a:t>
+            </a:r>
+            <a:r>
+              <a:rPr lang="en-US" dirty="0" smtClean="0"/>
+              <a:t>nctional </a:t>
+            </a:r>
+            <a:r>
+              <a:rPr lang="en-US" dirty="0"/>
+              <a:t>and Object Oriented</a:t>
+            </a:r>
+          </a:p>
+          <a:p>
+            <a:r>
+              <a:rPr lang="en-US" dirty="0"/>
+              <a:t>F# is a very robust </a:t>
+            </a:r>
+            <a:r>
+              <a:rPr lang="en-US" dirty="0" smtClean="0"/>
+              <a:t>language</a:t>
+            </a:r>
+          </a:p>
+          <a:p>
+            <a:pPr lvl="1"/>
+            <a:r>
+              <a:rPr lang="en-US" dirty="0" smtClean="0"/>
+              <a:t>Used in banking, stock transactions, scientific computing </a:t>
+            </a:r>
+            <a:endParaRPr lang="en-US" dirty="0"/>
           </a:p>
           <a:p>
             <a:r>
@@ -7647,21 +7714,31 @@
           <a:p>
             <a:r>
               <a:rPr lang="en-US" dirty="0"/>
-              <a:t>Your code uses LINQ &amp; </a:t>
-            </a:r>
-            <a:r>
-              <a:rPr lang="en-US" dirty="0" err="1"/>
-              <a:t>Funcs</a:t>
-            </a:r>
-            <a:r>
-              <a:rPr lang="en-US" dirty="0"/>
-              <a:t> a lot</a:t>
-            </a:r>
-          </a:p>
-          <a:p>
+              <a:t>Your code uses LINQ &amp; Funcs a </a:t>
+            </a:r>
+            <a:r>
+              <a:rPr lang="en-US" dirty="0" smtClean="0"/>
+              <a:t>lot</a:t>
+            </a:r>
+          </a:p>
+          <a:p>
+            <a:r>
+              <a:rPr lang="en-US" dirty="0" smtClean="0"/>
+              <a:t>You need Cross Platform development</a:t>
+            </a:r>
+          </a:p>
+          <a:p>
+            <a:pPr lvl="1"/>
+            <a:r>
+              <a:rPr lang="en-US" dirty="0" smtClean="0"/>
+              <a:t>Supports Windows, Linux, Android …</a:t>
+            </a:r>
             <a:endParaRPr lang="en-US" dirty="0"/>
           </a:p>
           <a:p>
+            <a:endParaRPr lang="en-US" dirty="0"/>
+          </a:p>
+          <a:p>
             <a:r>
               <a:rPr lang="en-US" dirty="0"/>
               <a:t>Virtually anywhere, but…</a:t>
@@ -7670,8 +7747,13 @@
           <a:p>
             <a:r>
               <a:rPr lang="en-US" dirty="0"/>
-              <a:t>Tooling is not as good as C#</a:t>
-            </a:r>
+              <a:t>Tooling is not as good as C</a:t>
+            </a:r>
+            <a:r>
+              <a:rPr lang="en-US" dirty="0" smtClean="0"/>
+              <a:t># (But getting better quickly)</a:t>
+            </a:r>
+            <a:endParaRPr lang="en-US" dirty="0"/>
           </a:p>
         </p:txBody>
       </p:sp>
@@ -8583,8 +8665,8 @@
         </p:blipFill>
         <p:spPr>
           <a:xfrm>
-            <a:off x="123567" y="1622854"/>
-            <a:ext cx="7825947" cy="4382529"/>
+            <a:off x="313349" y="1656271"/>
+            <a:ext cx="3534032" cy="2382289"/>
           </a:xfrm>
         </p:spPr>
       </p:pic>
@@ -8610,8 +8692,8 @@
         </p:blipFill>
         <p:spPr>
           <a:xfrm>
-            <a:off x="8206302" y="3150329"/>
-            <a:ext cx="3474952" cy="2492590"/>
+            <a:off x="4226943" y="1480751"/>
+            <a:ext cx="6755571" cy="4764773"/>
           </a:xfrm>
           <a:prstGeom prst="rect">
             <a:avLst/>

</xml_diff>